<commit_message>
Fix PowerMatch class diagram
</commit_message>
<xml_diff>
--- a/docs/diagrams/PowerMatchClassDiagram.pptx
+++ b/docs/diagrams/PowerMatchClassDiagram.pptx
@@ -208,7 +208,7 @@
           <a:p>
             <a:fld id="{F5CC4B3F-88C1-4FFA-B1B6-F41C21DC6924}" type="datetimeFigureOut">
               <a:rPr lang="en-US" smtClean="0"/>
-              <a:t>7/23/2017</a:t>
+              <a:t>24-Jul-17</a:t>
             </a:fld>
             <a:endParaRPr lang="en-US"/>
           </a:p>
@@ -654,7 +654,7 @@
           <a:p>
             <a:fld id="{78C97017-6FC3-485B-9764-EAC9E56C1D49}" type="datetimeFigureOut">
               <a:rPr lang="en-US" smtClean="0"/>
-              <a:t>7/23/2017</a:t>
+              <a:t>24-Jul-17</a:t>
             </a:fld>
             <a:endParaRPr lang="en-US"/>
           </a:p>
@@ -822,7 +822,7 @@
           <a:p>
             <a:fld id="{78C97017-6FC3-485B-9764-EAC9E56C1D49}" type="datetimeFigureOut">
               <a:rPr lang="en-US" smtClean="0"/>
-              <a:t>7/23/2017</a:t>
+              <a:t>24-Jul-17</a:t>
             </a:fld>
             <a:endParaRPr lang="en-US"/>
           </a:p>
@@ -1000,7 +1000,7 @@
           <a:p>
             <a:fld id="{78C97017-6FC3-485B-9764-EAC9E56C1D49}" type="datetimeFigureOut">
               <a:rPr lang="en-US" smtClean="0"/>
-              <a:t>7/23/2017</a:t>
+              <a:t>24-Jul-17</a:t>
             </a:fld>
             <a:endParaRPr lang="en-US"/>
           </a:p>
@@ -1168,7 +1168,7 @@
           <a:p>
             <a:fld id="{78C97017-6FC3-485B-9764-EAC9E56C1D49}" type="datetimeFigureOut">
               <a:rPr lang="en-US" smtClean="0"/>
-              <a:t>7/23/2017</a:t>
+              <a:t>24-Jul-17</a:t>
             </a:fld>
             <a:endParaRPr lang="en-US"/>
           </a:p>
@@ -1413,7 +1413,7 @@
           <a:p>
             <a:fld id="{78C97017-6FC3-485B-9764-EAC9E56C1D49}" type="datetimeFigureOut">
               <a:rPr lang="en-US" smtClean="0"/>
-              <a:t>7/23/2017</a:t>
+              <a:t>24-Jul-17</a:t>
             </a:fld>
             <a:endParaRPr lang="en-US"/>
           </a:p>
@@ -1698,7 +1698,7 @@
           <a:p>
             <a:fld id="{78C97017-6FC3-485B-9764-EAC9E56C1D49}" type="datetimeFigureOut">
               <a:rPr lang="en-US" smtClean="0"/>
-              <a:t>7/23/2017</a:t>
+              <a:t>24-Jul-17</a:t>
             </a:fld>
             <a:endParaRPr lang="en-US"/>
           </a:p>
@@ -2117,7 +2117,7 @@
           <a:p>
             <a:fld id="{78C97017-6FC3-485B-9764-EAC9E56C1D49}" type="datetimeFigureOut">
               <a:rPr lang="en-US" smtClean="0"/>
-              <a:t>7/23/2017</a:t>
+              <a:t>24-Jul-17</a:t>
             </a:fld>
             <a:endParaRPr lang="en-US"/>
           </a:p>
@@ -2234,7 +2234,7 @@
           <a:p>
             <a:fld id="{78C97017-6FC3-485B-9764-EAC9E56C1D49}" type="datetimeFigureOut">
               <a:rPr lang="en-US" smtClean="0"/>
-              <a:t>7/23/2017</a:t>
+              <a:t>24-Jul-17</a:t>
             </a:fld>
             <a:endParaRPr lang="en-US"/>
           </a:p>
@@ -2329,7 +2329,7 @@
           <a:p>
             <a:fld id="{78C97017-6FC3-485B-9764-EAC9E56C1D49}" type="datetimeFigureOut">
               <a:rPr lang="en-US" smtClean="0"/>
-              <a:t>7/23/2017</a:t>
+              <a:t>24-Jul-17</a:t>
             </a:fld>
             <a:endParaRPr lang="en-US"/>
           </a:p>
@@ -2604,7 +2604,7 @@
           <a:p>
             <a:fld id="{78C97017-6FC3-485B-9764-EAC9E56C1D49}" type="datetimeFigureOut">
               <a:rPr lang="en-US" smtClean="0"/>
-              <a:t>7/23/2017</a:t>
+              <a:t>24-Jul-17</a:t>
             </a:fld>
             <a:endParaRPr lang="en-US"/>
           </a:p>
@@ -2856,7 +2856,7 @@
           <a:p>
             <a:fld id="{78C97017-6FC3-485B-9764-EAC9E56C1D49}" type="datetimeFigureOut">
               <a:rPr lang="en-US" smtClean="0"/>
-              <a:t>7/23/2017</a:t>
+              <a:t>24-Jul-17</a:t>
             </a:fld>
             <a:endParaRPr lang="en-US"/>
           </a:p>
@@ -3067,7 +3067,7 @@
           <a:p>
             <a:fld id="{78C97017-6FC3-485B-9764-EAC9E56C1D49}" type="datetimeFigureOut">
               <a:rPr lang="en-US" smtClean="0"/>
-              <a:t>7/23/2017</a:t>
+              <a:t>24-Jul-17</a:t>
             </a:fld>
             <a:endParaRPr lang="en-US"/>
           </a:p>
@@ -3781,8 +3781,8 @@
         </p:nvSpPr>
         <p:spPr>
           <a:xfrm>
-            <a:off x="4023635" y="944880"/>
-            <a:ext cx="772043" cy="346760"/>
+            <a:off x="3836833" y="944880"/>
+            <a:ext cx="1116167" cy="346760"/>
           </a:xfrm>
           <a:prstGeom prst="rect">
             <a:avLst/>
@@ -3819,12 +3819,20 @@
           <a:p>
             <a:pPr algn="ctr"/>
             <a:r>
+              <a:rPr lang="en-US" sz="1050" b="1" dirty="0" smtClean="0">
+                <a:solidFill>
+                  <a:schemeClr val="bg1"/>
+                </a:solidFill>
+              </a:rPr>
+              <a:t>&lt;&lt;interface&gt;&gt;</a:t>
+            </a:r>
+            <a:r>
               <a:rPr lang="en-US" sz="1050" b="1" dirty="0">
                 <a:solidFill>
                   <a:schemeClr val="bg1"/>
                 </a:solidFill>
               </a:rPr>
-              <a:t>{abstract}</a:t>
+              <a:t/>
             </a:r>
             <a:br>
               <a:rPr lang="en-US" sz="1050" b="1" dirty="0">

</xml_diff>